<commit_message>
Final project presentation (again)
</commit_message>
<xml_diff>
--- a/DAT8SYD Project.pptx
+++ b/DAT8SYD Project.pptx
@@ -2999,7 +2999,7 @@
           <p:cNvPr id="2" name="Title 1">
             <a:extLst>
               <a:ext uri="{FF2B5EF4-FFF2-40B4-BE49-F238E27FC236}">
-                <a16:creationId xmlns="" xmlns:a16="http://schemas.microsoft.com/office/drawing/2014/main" id="{759C1F5B-D5D9-4BDD-865F-0D8A6DEF7E07}"/>
+                <a16:creationId xmlns:a16="http://schemas.microsoft.com/office/drawing/2014/main" xmlns="" id="{759C1F5B-D5D9-4BDD-865F-0D8A6DEF7E07}"/>
               </a:ext>
             </a:extLst>
           </p:cNvPr>
@@ -3112,6 +3112,13 @@
   <p:clrMapOvr>
     <a:masterClrMapping/>
   </p:clrMapOvr>
+  <p:timing>
+    <p:tnLst>
+      <p:par>
+        <p:cTn id="1" dur="indefinite" restart="never" nodeType="tmRoot"/>
+      </p:par>
+    </p:tnLst>
+  </p:timing>
 </p:sld>
 </file>
 
@@ -3137,7 +3144,7 @@
           <p:cNvPr id="2" name="Title 1">
             <a:extLst>
               <a:ext uri="{FF2B5EF4-FFF2-40B4-BE49-F238E27FC236}">
-                <a16:creationId xmlns="" xmlns:a16="http://schemas.microsoft.com/office/drawing/2014/main" id="{8FB09394-E721-41BB-8FB9-E4370A8824B4}"/>
+                <a16:creationId xmlns:a16="http://schemas.microsoft.com/office/drawing/2014/main" xmlns="" id="{8FB09394-E721-41BB-8FB9-E4370A8824B4}"/>
               </a:ext>
             </a:extLst>
           </p:cNvPr>
@@ -3192,7 +3199,7 @@
           <p:cNvPr id="3" name="Picture 2">
             <a:extLst>
               <a:ext uri="{FF2B5EF4-FFF2-40B4-BE49-F238E27FC236}">
-                <a16:creationId xmlns="" xmlns:a16="http://schemas.microsoft.com/office/drawing/2014/main" id="{16859D27-82BE-44FD-9181-454183F99C05}"/>
+                <a16:creationId xmlns:a16="http://schemas.microsoft.com/office/drawing/2014/main" xmlns="" id="{16859D27-82BE-44FD-9181-454183F99C05}"/>
               </a:ext>
             </a:extLst>
           </p:cNvPr>
@@ -3227,6 +3234,13 @@
   <p:clrMapOvr>
     <a:masterClrMapping/>
   </p:clrMapOvr>
+  <p:timing>
+    <p:tnLst>
+      <p:par>
+        <p:cTn id="1" dur="indefinite" restart="never" nodeType="tmRoot"/>
+      </p:par>
+    </p:tnLst>
+  </p:timing>
 </p:sld>
 </file>
 
@@ -3252,7 +3266,7 @@
           <p:cNvPr id="2" name="Title 1">
             <a:extLst>
               <a:ext uri="{FF2B5EF4-FFF2-40B4-BE49-F238E27FC236}">
-                <a16:creationId xmlns="" xmlns:a16="http://schemas.microsoft.com/office/drawing/2014/main" id="{776F97E8-7A45-4980-B854-3284354D605F}"/>
+                <a16:creationId xmlns:a16="http://schemas.microsoft.com/office/drawing/2014/main" xmlns="" id="{776F97E8-7A45-4980-B854-3284354D605F}"/>
               </a:ext>
             </a:extLst>
           </p:cNvPr>
@@ -3281,7 +3295,7 @@
           <p:cNvPr id="3" name="Content Placeholder 2">
             <a:extLst>
               <a:ext uri="{FF2B5EF4-FFF2-40B4-BE49-F238E27FC236}">
-                <a16:creationId xmlns="" xmlns:a16="http://schemas.microsoft.com/office/drawing/2014/main" id="{8CF0E35B-5B7D-4902-B39E-1D11D9F8B10E}"/>
+                <a16:creationId xmlns:a16="http://schemas.microsoft.com/office/drawing/2014/main" xmlns="" id="{8CF0E35B-5B7D-4902-B39E-1D11D9F8B10E}"/>
               </a:ext>
             </a:extLst>
           </p:cNvPr>
@@ -3359,6 +3373,13 @@
   <p:clrMapOvr>
     <a:masterClrMapping/>
   </p:clrMapOvr>
+  <p:timing>
+    <p:tnLst>
+      <p:par>
+        <p:cTn id="1" dur="indefinite" restart="never" nodeType="tmRoot"/>
+      </p:par>
+    </p:tnLst>
+  </p:timing>
 </p:sld>
 </file>
 
@@ -3384,7 +3405,7 @@
           <p:cNvPr id="2" name="Title 1">
             <a:extLst>
               <a:ext uri="{FF2B5EF4-FFF2-40B4-BE49-F238E27FC236}">
-                <a16:creationId xmlns="" xmlns:a16="http://schemas.microsoft.com/office/drawing/2014/main" id="{8FB09394-E721-41BB-8FB9-E4370A8824B4}"/>
+                <a16:creationId xmlns:a16="http://schemas.microsoft.com/office/drawing/2014/main" xmlns="" id="{8FB09394-E721-41BB-8FB9-E4370A8824B4}"/>
               </a:ext>
             </a:extLst>
           </p:cNvPr>
@@ -3439,7 +3460,7 @@
           <p:cNvPr id="3" name="Picture 2">
             <a:extLst>
               <a:ext uri="{FF2B5EF4-FFF2-40B4-BE49-F238E27FC236}">
-                <a16:creationId xmlns="" xmlns:a16="http://schemas.microsoft.com/office/drawing/2014/main" id="{7E2DE9BC-EA60-48A9-9A47-8A74E0B16B38}"/>
+                <a16:creationId xmlns:a16="http://schemas.microsoft.com/office/drawing/2014/main" xmlns="" id="{7E2DE9BC-EA60-48A9-9A47-8A74E0B16B38}"/>
               </a:ext>
             </a:extLst>
           </p:cNvPr>
@@ -3474,6 +3495,13 @@
   <p:clrMapOvr>
     <a:masterClrMapping/>
   </p:clrMapOvr>
+  <p:timing>
+    <p:tnLst>
+      <p:par>
+        <p:cTn id="1" dur="indefinite" restart="never" nodeType="tmRoot"/>
+      </p:par>
+    </p:tnLst>
+  </p:timing>
 </p:sld>
 </file>
 
@@ -3499,7 +3527,7 @@
           <p:cNvPr id="2" name="Title 1">
             <a:extLst>
               <a:ext uri="{FF2B5EF4-FFF2-40B4-BE49-F238E27FC236}">
-                <a16:creationId xmlns="" xmlns:a16="http://schemas.microsoft.com/office/drawing/2014/main" id="{8FB09394-E721-41BB-8FB9-E4370A8824B4}"/>
+                <a16:creationId xmlns:a16="http://schemas.microsoft.com/office/drawing/2014/main" xmlns="" id="{8FB09394-E721-41BB-8FB9-E4370A8824B4}"/>
               </a:ext>
             </a:extLst>
           </p:cNvPr>
@@ -3554,7 +3582,7 @@
           <p:cNvPr id="4" name="Picture 3">
             <a:extLst>
               <a:ext uri="{FF2B5EF4-FFF2-40B4-BE49-F238E27FC236}">
-                <a16:creationId xmlns="" xmlns:a16="http://schemas.microsoft.com/office/drawing/2014/main" id="{C9E93D40-C668-404D-A033-E89984698A0F}"/>
+                <a16:creationId xmlns:a16="http://schemas.microsoft.com/office/drawing/2014/main" xmlns="" id="{C9E93D40-C668-404D-A033-E89984698A0F}"/>
               </a:ext>
             </a:extLst>
           </p:cNvPr>
@@ -3589,6 +3617,13 @@
   <p:clrMapOvr>
     <a:masterClrMapping/>
   </p:clrMapOvr>
+  <p:timing>
+    <p:tnLst>
+      <p:par>
+        <p:cTn id="1" dur="indefinite" restart="never" nodeType="tmRoot"/>
+      </p:par>
+    </p:tnLst>
+  </p:timing>
 </p:sld>
 </file>
 
@@ -3614,7 +3649,7 @@
           <p:cNvPr id="2" name="Title 1">
             <a:extLst>
               <a:ext uri="{FF2B5EF4-FFF2-40B4-BE49-F238E27FC236}">
-                <a16:creationId xmlns="" xmlns:a16="http://schemas.microsoft.com/office/drawing/2014/main" id="{DEB74190-64C2-4E75-B4D7-714C8491B449}"/>
+                <a16:creationId xmlns:a16="http://schemas.microsoft.com/office/drawing/2014/main" xmlns="" id="{DEB74190-64C2-4E75-B4D7-714C8491B449}"/>
               </a:ext>
             </a:extLst>
           </p:cNvPr>
@@ -3662,7 +3697,7 @@
           <p:cNvPr id="3" name="Picture 2">
             <a:extLst>
               <a:ext uri="{FF2B5EF4-FFF2-40B4-BE49-F238E27FC236}">
-                <a16:creationId xmlns="" xmlns:a16="http://schemas.microsoft.com/office/drawing/2014/main" id="{E0952DBD-2EB2-4FC5-B249-917E2B3D712E}"/>
+                <a16:creationId xmlns:a16="http://schemas.microsoft.com/office/drawing/2014/main" xmlns="" id="{E0952DBD-2EB2-4FC5-B249-917E2B3D712E}"/>
               </a:ext>
             </a:extLst>
           </p:cNvPr>
@@ -3698,6 +3733,51 @@
           </a:prstGeom>
         </p:spPr>
       </p:pic>
+      <p:sp>
+        <p:nvSpPr>
+          <p:cNvPr id="5" name="Oval 4"/>
+          <p:cNvSpPr/>
+          <p:nvPr/>
+        </p:nvSpPr>
+        <p:spPr>
+          <a:xfrm>
+            <a:off x="1775520" y="4689140"/>
+            <a:ext cx="1224136" cy="648072"/>
+          </a:xfrm>
+          <a:prstGeom prst="ellipse">
+            <a:avLst/>
+          </a:prstGeom>
+          <a:noFill/>
+          <a:ln w="57150">
+            <a:solidFill>
+              <a:srgbClr val="FF0000"/>
+            </a:solidFill>
+          </a:ln>
+          <a:effectLst/>
+        </p:spPr>
+        <p:style>
+          <a:lnRef idx="1">
+            <a:schemeClr val="accent1"/>
+          </a:lnRef>
+          <a:fillRef idx="3">
+            <a:schemeClr val="accent1"/>
+          </a:fillRef>
+          <a:effectRef idx="2">
+            <a:schemeClr val="accent1"/>
+          </a:effectRef>
+          <a:fontRef idx="minor">
+            <a:schemeClr val="lt1"/>
+          </a:fontRef>
+        </p:style>
+        <p:txBody>
+          <a:bodyPr rtlCol="0" anchor="ctr"/>
+          <a:lstStyle/>
+          <a:p>
+            <a:pPr algn="ctr"/>
+            <a:endParaRPr lang="en-AU"/>
+          </a:p>
+        </p:txBody>
+      </p:sp>
     </p:spTree>
     <p:extLst>
       <p:ext uri="{BB962C8B-B14F-4D97-AF65-F5344CB8AC3E}">
@@ -3708,6 +3788,13 @@
   <p:clrMapOvr>
     <a:masterClrMapping/>
   </p:clrMapOvr>
+  <p:timing>
+    <p:tnLst>
+      <p:par>
+        <p:cTn id="1" dur="indefinite" restart="never" nodeType="tmRoot"/>
+      </p:par>
+    </p:tnLst>
+  </p:timing>
 </p:sld>
 </file>
 
@@ -3733,7 +3820,7 @@
           <p:cNvPr id="2" name="Title 1">
             <a:extLst>
               <a:ext uri="{FF2B5EF4-FFF2-40B4-BE49-F238E27FC236}">
-                <a16:creationId xmlns="" xmlns:a16="http://schemas.microsoft.com/office/drawing/2014/main" id="{DEB74190-64C2-4E75-B4D7-714C8491B449}"/>
+                <a16:creationId xmlns:a16="http://schemas.microsoft.com/office/drawing/2014/main" xmlns="" id="{DEB74190-64C2-4E75-B4D7-714C8491B449}"/>
               </a:ext>
             </a:extLst>
           </p:cNvPr>
@@ -3764,7 +3851,15 @@
             </a:r>
             <a:r>
               <a:rPr lang="en-US" sz="2800" dirty="0"/>
-              <a:t>m4.4xlarge Instance</a:t>
+              <a:t>m4.4xlarge </a:t>
+            </a:r>
+            <a:r>
+              <a:rPr lang="en-US" sz="2800" dirty="0" smtClean="0"/>
+              <a:t>Instance @ $1,000 per month</a:t>
+            </a:r>
+            <a:r>
+              <a:rPr lang="en-US" sz="2800" dirty="0"/>
+              <a:t/>
             </a:r>
             <a:br>
               <a:rPr lang="en-US" sz="2800" dirty="0"/>
@@ -3792,7 +3887,7 @@
           <a:bodyPr/>
           <a:lstStyle/>
           <a:p>
-            <a:endParaRPr lang="en-AU"/>
+            <a:endParaRPr lang="en-AU" dirty="0"/>
           </a:p>
         </p:txBody>
       </p:sp>
@@ -3801,7 +3896,7 @@
           <p:cNvPr id="4" name="Picture 3">
             <a:extLst>
               <a:ext uri="{FF2B5EF4-FFF2-40B4-BE49-F238E27FC236}">
-                <a16:creationId xmlns="" xmlns:a16="http://schemas.microsoft.com/office/drawing/2014/main" id="{6F074A03-F633-434A-AB1E-C31C0726BF73}"/>
+                <a16:creationId xmlns:a16="http://schemas.microsoft.com/office/drawing/2014/main" xmlns="" id="{6F074A03-F633-434A-AB1E-C31C0726BF73}"/>
               </a:ext>
             </a:extLst>
           </p:cNvPr>
@@ -3836,6 +3931,13 @@
   <p:clrMapOvr>
     <a:masterClrMapping/>
   </p:clrMapOvr>
+  <p:timing>
+    <p:tnLst>
+      <p:par>
+        <p:cTn id="1" dur="indefinite" restart="never" nodeType="tmRoot"/>
+      </p:par>
+    </p:tnLst>
+  </p:timing>
 </p:sld>
 </file>
 
@@ -3861,7 +3963,7 @@
           <p:cNvPr id="5" name="Picture 4">
             <a:extLst>
               <a:ext uri="{FF2B5EF4-FFF2-40B4-BE49-F238E27FC236}">
-                <a16:creationId xmlns="" xmlns:a16="http://schemas.microsoft.com/office/drawing/2014/main" id="{78A1FEC0-D7B8-4459-8394-E05D961C5269}"/>
+                <a16:creationId xmlns:a16="http://schemas.microsoft.com/office/drawing/2014/main" xmlns="" id="{78A1FEC0-D7B8-4459-8394-E05D961C5269}"/>
               </a:ext>
             </a:extLst>
           </p:cNvPr>
@@ -3890,7 +3992,7 @@
           <p:cNvPr id="2" name="Title 1">
             <a:extLst>
               <a:ext uri="{FF2B5EF4-FFF2-40B4-BE49-F238E27FC236}">
-                <a16:creationId xmlns="" xmlns:a16="http://schemas.microsoft.com/office/drawing/2014/main" id="{2C35E2E9-CB83-41CF-82CA-B32B5B2FC6DA}"/>
+                <a16:creationId xmlns:a16="http://schemas.microsoft.com/office/drawing/2014/main" xmlns="" id="{2C35E2E9-CB83-41CF-82CA-B32B5B2FC6DA}"/>
               </a:ext>
             </a:extLst>
           </p:cNvPr>
@@ -3919,7 +4021,7 @@
           <p:cNvPr id="3" name="Content Placeholder 2">
             <a:extLst>
               <a:ext uri="{FF2B5EF4-FFF2-40B4-BE49-F238E27FC236}">
-                <a16:creationId xmlns="" xmlns:a16="http://schemas.microsoft.com/office/drawing/2014/main" id="{C24CFE06-9A2F-4BE1-9F5F-AD50A0D5D729}"/>
+                <a16:creationId xmlns:a16="http://schemas.microsoft.com/office/drawing/2014/main" xmlns="" id="{C24CFE06-9A2F-4BE1-9F5F-AD50A0D5D729}"/>
               </a:ext>
             </a:extLst>
           </p:cNvPr>
@@ -3966,7 +4068,7 @@
           <p:cNvPr id="4" name="Picture 3">
             <a:extLst>
               <a:ext uri="{FF2B5EF4-FFF2-40B4-BE49-F238E27FC236}">
-                <a16:creationId xmlns="" xmlns:a16="http://schemas.microsoft.com/office/drawing/2014/main" id="{93BCD3EE-3D30-4BBA-9A25-44DCB791349B}"/>
+                <a16:creationId xmlns:a16="http://schemas.microsoft.com/office/drawing/2014/main" xmlns="" id="{93BCD3EE-3D30-4BBA-9A25-44DCB791349B}"/>
               </a:ext>
             </a:extLst>
           </p:cNvPr>
@@ -4833,6 +4935,13 @@
   <p:clrMapOvr>
     <a:masterClrMapping/>
   </p:clrMapOvr>
+  <p:timing>
+    <p:tnLst>
+      <p:par>
+        <p:cTn id="1" dur="indefinite" restart="never" nodeType="tmRoot"/>
+      </p:par>
+    </p:tnLst>
+  </p:timing>
 </p:sld>
 </file>
 
@@ -4858,7 +4967,7 @@
           <p:cNvPr id="2" name="Title 1">
             <a:extLst>
               <a:ext uri="{FF2B5EF4-FFF2-40B4-BE49-F238E27FC236}">
-                <a16:creationId xmlns="" xmlns:a16="http://schemas.microsoft.com/office/drawing/2014/main" id="{E11169D7-2CDA-4C9C-8617-5378E543AF15}"/>
+                <a16:creationId xmlns:a16="http://schemas.microsoft.com/office/drawing/2014/main" xmlns="" id="{E11169D7-2CDA-4C9C-8617-5378E543AF15}"/>
               </a:ext>
             </a:extLst>
           </p:cNvPr>
@@ -4906,7 +5015,7 @@
           <p:cNvPr id="3" name="Picture 2">
             <a:extLst>
               <a:ext uri="{FF2B5EF4-FFF2-40B4-BE49-F238E27FC236}">
-                <a16:creationId xmlns="" xmlns:a16="http://schemas.microsoft.com/office/drawing/2014/main" id="{6700875A-AC91-4F71-AA99-87BCE3DD090C}"/>
+                <a16:creationId xmlns:a16="http://schemas.microsoft.com/office/drawing/2014/main" xmlns="" id="{6700875A-AC91-4F71-AA99-87BCE3DD090C}"/>
               </a:ext>
             </a:extLst>
           </p:cNvPr>
@@ -4941,6 +5050,13 @@
   <p:clrMapOvr>
     <a:masterClrMapping/>
   </p:clrMapOvr>
+  <p:timing>
+    <p:tnLst>
+      <p:par>
+        <p:cTn id="1" dur="indefinite" restart="never" nodeType="tmRoot"/>
+      </p:par>
+    </p:tnLst>
+  </p:timing>
 </p:sld>
 </file>
 
@@ -4966,7 +5082,7 @@
           <p:cNvPr id="2" name="Title 1">
             <a:extLst>
               <a:ext uri="{FF2B5EF4-FFF2-40B4-BE49-F238E27FC236}">
-                <a16:creationId xmlns="" xmlns:a16="http://schemas.microsoft.com/office/drawing/2014/main" id="{E4744647-045D-4FFE-92C3-8C6F4C01149A}"/>
+                <a16:creationId xmlns:a16="http://schemas.microsoft.com/office/drawing/2014/main" xmlns="" id="{E4744647-045D-4FFE-92C3-8C6F4C01149A}"/>
               </a:ext>
             </a:extLst>
           </p:cNvPr>
@@ -4995,7 +5111,7 @@
           <p:cNvPr id="3" name="Content Placeholder 2">
             <a:extLst>
               <a:ext uri="{FF2B5EF4-FFF2-40B4-BE49-F238E27FC236}">
-                <a16:creationId xmlns="" xmlns:a16="http://schemas.microsoft.com/office/drawing/2014/main" id="{68BB659B-DC45-46B9-B84A-23A79BF9446A}"/>
+                <a16:creationId xmlns:a16="http://schemas.microsoft.com/office/drawing/2014/main" xmlns="" id="{68BB659B-DC45-46B9-B84A-23A79BF9446A}"/>
               </a:ext>
             </a:extLst>
           </p:cNvPr>
@@ -5035,6 +5151,13 @@
   <p:clrMapOvr>
     <a:masterClrMapping/>
   </p:clrMapOvr>
+  <p:timing>
+    <p:tnLst>
+      <p:par>
+        <p:cTn id="1" dur="indefinite" restart="never" nodeType="tmRoot"/>
+      </p:par>
+    </p:tnLst>
+  </p:timing>
 </p:sld>
 </file>
 
@@ -5091,13 +5214,26 @@
         <p:spPr/>
         <p:txBody>
           <a:bodyPr>
-            <a:normAutofit/>
+            <a:normAutofit fontScale="92500" lnSpcReduction="10000"/>
           </a:bodyPr>
           <a:lstStyle/>
           <a:p>
             <a:r>
               <a:rPr lang="en-AU" sz="1800" dirty="0" smtClean="0"/>
-              <a:t>Try other clustering algorithms</a:t>
+              <a:t>Look for more clusters</a:t>
+            </a:r>
+          </a:p>
+          <a:p>
+            <a:endParaRPr lang="en-AU" sz="1800" dirty="0" smtClean="0"/>
+          </a:p>
+          <a:p>
+            <a:r>
+              <a:rPr lang="en-AU" sz="1800" dirty="0" smtClean="0"/>
+              <a:t>Try </a:t>
+            </a:r>
+            <a:r>
+              <a:rPr lang="en-AU" sz="1800" dirty="0" smtClean="0"/>
+              <a:t>other clustering algorithms</a:t>
             </a:r>
           </a:p>
           <a:p>
@@ -5205,6 +5341,13 @@
   <p:clrMapOvr>
     <a:masterClrMapping/>
   </p:clrMapOvr>
+  <p:timing>
+    <p:tnLst>
+      <p:par>
+        <p:cTn id="1" dur="indefinite" restart="never" nodeType="tmRoot"/>
+      </p:par>
+    </p:tnLst>
+  </p:timing>
 </p:sld>
 </file>
 
@@ -5230,7 +5373,7 @@
           <p:cNvPr id="4" name="Title 3">
             <a:extLst>
               <a:ext uri="{FF2B5EF4-FFF2-40B4-BE49-F238E27FC236}">
-                <a16:creationId xmlns="" xmlns:a16="http://schemas.microsoft.com/office/drawing/2014/main" id="{9D15467B-8C58-4372-9E21-220A21FF0646}"/>
+                <a16:creationId xmlns:a16="http://schemas.microsoft.com/office/drawing/2014/main" xmlns="" id="{9D15467B-8C58-4372-9E21-220A21FF0646}"/>
               </a:ext>
             </a:extLst>
           </p:cNvPr>
@@ -5259,7 +5402,7 @@
           <p:cNvPr id="5" name="Content Placeholder 4">
             <a:extLst>
               <a:ext uri="{FF2B5EF4-FFF2-40B4-BE49-F238E27FC236}">
-                <a16:creationId xmlns="" xmlns:a16="http://schemas.microsoft.com/office/drawing/2014/main" id="{18A27D6B-811A-48C5-9A08-F568B6F5F75F}"/>
+                <a16:creationId xmlns:a16="http://schemas.microsoft.com/office/drawing/2014/main" xmlns="" id="{18A27D6B-811A-48C5-9A08-F568B6F5F75F}"/>
               </a:ext>
             </a:extLst>
           </p:cNvPr>
@@ -5324,7 +5467,7 @@
           <p:cNvPr id="1026" name="Picture 2" descr="Supa Centa Moore Park">
             <a:extLst>
               <a:ext uri="{FF2B5EF4-FFF2-40B4-BE49-F238E27FC236}">
-                <a16:creationId xmlns="" xmlns:a16="http://schemas.microsoft.com/office/drawing/2014/main" id="{6D89F3CF-1450-4BB5-B7EA-E4673C65CA25}"/>
+                <a16:creationId xmlns:a16="http://schemas.microsoft.com/office/drawing/2014/main" xmlns="" id="{6D89F3CF-1450-4BB5-B7EA-E4673C65CA25}"/>
               </a:ext>
             </a:extLst>
           </p:cNvPr>
@@ -5381,7 +5524,7 @@
           <p:cNvPr id="1028" name="Picture 4" descr="Image result for supa centa moore park">
             <a:extLst>
               <a:ext uri="{FF2B5EF4-FFF2-40B4-BE49-F238E27FC236}">
-                <a16:creationId xmlns="" xmlns:a16="http://schemas.microsoft.com/office/drawing/2014/main" id="{49CBE883-B6A4-411C-ACA5-7DE42CA74B08}"/>
+                <a16:creationId xmlns:a16="http://schemas.microsoft.com/office/drawing/2014/main" xmlns="" id="{49CBE883-B6A4-411C-ACA5-7DE42CA74B08}"/>
               </a:ext>
             </a:extLst>
           </p:cNvPr>
@@ -5431,6 +5574,13 @@
   <p:clrMapOvr>
     <a:masterClrMapping/>
   </p:clrMapOvr>
+  <p:timing>
+    <p:tnLst>
+      <p:par>
+        <p:cTn id="1" dur="indefinite" restart="never" nodeType="tmRoot"/>
+      </p:par>
+    </p:tnLst>
+  </p:timing>
 </p:sld>
 </file>
 
@@ -5456,7 +5606,7 @@
           <p:cNvPr id="2" name="Title 1">
             <a:extLst>
               <a:ext uri="{FF2B5EF4-FFF2-40B4-BE49-F238E27FC236}">
-                <a16:creationId xmlns="" xmlns:a16="http://schemas.microsoft.com/office/drawing/2014/main" id="{8DF68099-1F29-49C2-BD80-42AC514833EE}"/>
+                <a16:creationId xmlns:a16="http://schemas.microsoft.com/office/drawing/2014/main" xmlns="" id="{8DF68099-1F29-49C2-BD80-42AC514833EE}"/>
               </a:ext>
             </a:extLst>
           </p:cNvPr>
@@ -5485,7 +5635,7 @@
           <p:cNvPr id="3" name="Content Placeholder 2">
             <a:extLst>
               <a:ext uri="{FF2B5EF4-FFF2-40B4-BE49-F238E27FC236}">
-                <a16:creationId xmlns="" xmlns:a16="http://schemas.microsoft.com/office/drawing/2014/main" id="{D2C38CF8-D05A-4C7B-8C67-C7327A69F2D4}"/>
+                <a16:creationId xmlns:a16="http://schemas.microsoft.com/office/drawing/2014/main" xmlns="" id="{D2C38CF8-D05A-4C7B-8C67-C7327A69F2D4}"/>
               </a:ext>
             </a:extLst>
           </p:cNvPr>
@@ -5556,21 +5706,21 @@
             <a:endParaRPr lang="en-US" dirty="0"/>
           </a:p>
           <a:p>
-            <a:pPr lvl="1"/>
+            <a:pPr lvl="2"/>
             <a:r>
               <a:rPr lang="en-US" dirty="0"/>
               <a:t>Timestamp</a:t>
             </a:r>
           </a:p>
           <a:p>
-            <a:pPr lvl="1"/>
+            <a:pPr lvl="2"/>
             <a:r>
               <a:rPr lang="en-US" dirty="0"/>
               <a:t>MAC Address</a:t>
             </a:r>
           </a:p>
           <a:p>
-            <a:pPr lvl="1"/>
+            <a:pPr lvl="2"/>
             <a:r>
               <a:rPr lang="en-US" dirty="0"/>
               <a:t>Access Point</a:t>
@@ -5614,6 +5764,13 @@
   <p:clrMapOvr>
     <a:masterClrMapping/>
   </p:clrMapOvr>
+  <p:timing>
+    <p:tnLst>
+      <p:par>
+        <p:cTn id="1" dur="indefinite" restart="never" nodeType="tmRoot"/>
+      </p:par>
+    </p:tnLst>
+  </p:timing>
 </p:sld>
 </file>
 
@@ -5639,7 +5796,7 @@
           <p:cNvPr id="2" name="Picture 1">
             <a:extLst>
               <a:ext uri="{FF2B5EF4-FFF2-40B4-BE49-F238E27FC236}">
-                <a16:creationId xmlns="" xmlns:a16="http://schemas.microsoft.com/office/drawing/2014/main" id="{465EAEA9-F9AC-4874-9C7A-20E104397892}"/>
+                <a16:creationId xmlns:a16="http://schemas.microsoft.com/office/drawing/2014/main" xmlns="" id="{465EAEA9-F9AC-4874-9C7A-20E104397892}"/>
               </a:ext>
             </a:extLst>
           </p:cNvPr>
@@ -5697,6 +5854,13 @@
   <p:clrMapOvr>
     <a:masterClrMapping/>
   </p:clrMapOvr>
+  <p:timing>
+    <p:tnLst>
+      <p:par>
+        <p:cTn id="1" dur="indefinite" restart="never" nodeType="tmRoot"/>
+      </p:par>
+    </p:tnLst>
+  </p:timing>
 </p:sld>
 </file>
 
@@ -5722,7 +5886,7 @@
           <p:cNvPr id="2" name="Title 1">
             <a:extLst>
               <a:ext uri="{FF2B5EF4-FFF2-40B4-BE49-F238E27FC236}">
-                <a16:creationId xmlns="" xmlns:a16="http://schemas.microsoft.com/office/drawing/2014/main" id="{179B9CDE-7C82-4AFB-AEBF-7D2190AB3351}"/>
+                <a16:creationId xmlns:a16="http://schemas.microsoft.com/office/drawing/2014/main" xmlns="" id="{179B9CDE-7C82-4AFB-AEBF-7D2190AB3351}"/>
               </a:ext>
             </a:extLst>
           </p:cNvPr>
@@ -5751,7 +5915,7 @@
           <p:cNvPr id="3" name="Content Placeholder 2">
             <a:extLst>
               <a:ext uri="{FF2B5EF4-FFF2-40B4-BE49-F238E27FC236}">
-                <a16:creationId xmlns="" xmlns:a16="http://schemas.microsoft.com/office/drawing/2014/main" id="{B78B2497-B035-47D8-BC2D-275280AD46CD}"/>
+                <a16:creationId xmlns:a16="http://schemas.microsoft.com/office/drawing/2014/main" xmlns="" id="{B78B2497-B035-47D8-BC2D-275280AD46CD}"/>
               </a:ext>
             </a:extLst>
           </p:cNvPr>
@@ -5926,7 +6090,7 @@
           <p:cNvPr id="4" name="TextBox 3">
             <a:extLst>
               <a:ext uri="{FF2B5EF4-FFF2-40B4-BE49-F238E27FC236}">
-                <a16:creationId xmlns="" xmlns:a16="http://schemas.microsoft.com/office/drawing/2014/main" id="{3890020F-EA90-4999-A05C-35F260828293}"/>
+                <a16:creationId xmlns:a16="http://schemas.microsoft.com/office/drawing/2014/main" xmlns="" id="{3890020F-EA90-4999-A05C-35F260828293}"/>
               </a:ext>
             </a:extLst>
           </p:cNvPr>
@@ -5971,6 +6135,13 @@
   <p:clrMapOvr>
     <a:masterClrMapping/>
   </p:clrMapOvr>
+  <p:timing>
+    <p:tnLst>
+      <p:par>
+        <p:cTn id="1" dur="indefinite" restart="never" nodeType="tmRoot"/>
+      </p:par>
+    </p:tnLst>
+  </p:timing>
 </p:sld>
 </file>
 
@@ -5996,7 +6167,7 @@
           <p:cNvPr id="2" name="Title 1">
             <a:extLst>
               <a:ext uri="{FF2B5EF4-FFF2-40B4-BE49-F238E27FC236}">
-                <a16:creationId xmlns="" xmlns:a16="http://schemas.microsoft.com/office/drawing/2014/main" id="{915441A8-D672-460F-888F-B9BF8CDAFD54}"/>
+                <a16:creationId xmlns:a16="http://schemas.microsoft.com/office/drawing/2014/main" xmlns="" id="{915441A8-D672-460F-888F-B9BF8CDAFD54}"/>
               </a:ext>
             </a:extLst>
           </p:cNvPr>
@@ -6225,7 +6396,7 @@
           <p:cNvPr id="17" name="Picture 16">
             <a:extLst>
               <a:ext uri="{FF2B5EF4-FFF2-40B4-BE49-F238E27FC236}">
-                <a16:creationId xmlns="" xmlns:a16="http://schemas.microsoft.com/office/drawing/2014/main" id="{E7FCF0D7-633C-4F5B-9B04-36CC5231613A}"/>
+                <a16:creationId xmlns:a16="http://schemas.microsoft.com/office/drawing/2014/main" xmlns="" id="{E7FCF0D7-633C-4F5B-9B04-36CC5231613A}"/>
               </a:ext>
             </a:extLst>
           </p:cNvPr>
@@ -6255,7 +6426,7 @@
           <p:cNvPr id="18" name="Picture 17">
             <a:extLst>
               <a:ext uri="{FF2B5EF4-FFF2-40B4-BE49-F238E27FC236}">
-                <a16:creationId xmlns="" xmlns:a16="http://schemas.microsoft.com/office/drawing/2014/main" id="{71352179-312A-4FD2-8508-F15E2B9549EE}"/>
+                <a16:creationId xmlns:a16="http://schemas.microsoft.com/office/drawing/2014/main" xmlns="" id="{71352179-312A-4FD2-8508-F15E2B9549EE}"/>
               </a:ext>
             </a:extLst>
           </p:cNvPr>
@@ -6285,7 +6456,7 @@
           <p:cNvPr id="19" name="Picture 18">
             <a:extLst>
               <a:ext uri="{FF2B5EF4-FFF2-40B4-BE49-F238E27FC236}">
-                <a16:creationId xmlns="" xmlns:a16="http://schemas.microsoft.com/office/drawing/2014/main" id="{AF3EB750-43C2-457D-A989-78474085A846}"/>
+                <a16:creationId xmlns:a16="http://schemas.microsoft.com/office/drawing/2014/main" xmlns="" id="{AF3EB750-43C2-457D-A989-78474085A846}"/>
               </a:ext>
             </a:extLst>
           </p:cNvPr>
@@ -6315,7 +6486,7 @@
           <p:cNvPr id="20" name="Picture 19">
             <a:extLst>
               <a:ext uri="{FF2B5EF4-FFF2-40B4-BE49-F238E27FC236}">
-                <a16:creationId xmlns="" xmlns:a16="http://schemas.microsoft.com/office/drawing/2014/main" id="{CC99F6AB-172C-4A7A-9E10-EB71E802F576}"/>
+                <a16:creationId xmlns:a16="http://schemas.microsoft.com/office/drawing/2014/main" xmlns="" id="{CC99F6AB-172C-4A7A-9E10-EB71E802F576}"/>
               </a:ext>
             </a:extLst>
           </p:cNvPr>
@@ -6350,6 +6521,13 @@
   <p:clrMapOvr>
     <a:masterClrMapping/>
   </p:clrMapOvr>
+  <p:timing>
+    <p:tnLst>
+      <p:par>
+        <p:cTn id="1" dur="indefinite" restart="never" nodeType="tmRoot"/>
+      </p:par>
+    </p:tnLst>
+  </p:timing>
 </p:sld>
 </file>
 
@@ -6375,7 +6553,7 @@
           <p:cNvPr id="2" name="Title 1">
             <a:extLst>
               <a:ext uri="{FF2B5EF4-FFF2-40B4-BE49-F238E27FC236}">
-                <a16:creationId xmlns="" xmlns:a16="http://schemas.microsoft.com/office/drawing/2014/main" id="{8FB09394-E721-41BB-8FB9-E4370A8824B4}"/>
+                <a16:creationId xmlns:a16="http://schemas.microsoft.com/office/drawing/2014/main" xmlns="" id="{8FB09394-E721-41BB-8FB9-E4370A8824B4}"/>
               </a:ext>
             </a:extLst>
           </p:cNvPr>
@@ -6430,7 +6608,7 @@
           <p:cNvPr id="3" name="Picture 2">
             <a:extLst>
               <a:ext uri="{FF2B5EF4-FFF2-40B4-BE49-F238E27FC236}">
-                <a16:creationId xmlns="" xmlns:a16="http://schemas.microsoft.com/office/drawing/2014/main" id="{53AFDE04-7149-4C42-8C94-EBD48F46D615}"/>
+                <a16:creationId xmlns:a16="http://schemas.microsoft.com/office/drawing/2014/main" xmlns="" id="{53AFDE04-7149-4C42-8C94-EBD48F46D615}"/>
               </a:ext>
             </a:extLst>
           </p:cNvPr>
@@ -6465,6 +6643,13 @@
   <p:clrMapOvr>
     <a:masterClrMapping/>
   </p:clrMapOvr>
+  <p:timing>
+    <p:tnLst>
+      <p:par>
+        <p:cTn id="1" dur="indefinite" restart="never" nodeType="tmRoot"/>
+      </p:par>
+    </p:tnLst>
+  </p:timing>
 </p:sld>
 </file>
 
@@ -6490,7 +6675,7 @@
           <p:cNvPr id="2" name="Title 1">
             <a:extLst>
               <a:ext uri="{FF2B5EF4-FFF2-40B4-BE49-F238E27FC236}">
-                <a16:creationId xmlns="" xmlns:a16="http://schemas.microsoft.com/office/drawing/2014/main" id="{8FB09394-E721-41BB-8FB9-E4370A8824B4}"/>
+                <a16:creationId xmlns:a16="http://schemas.microsoft.com/office/drawing/2014/main" xmlns="" id="{8FB09394-E721-41BB-8FB9-E4370A8824B4}"/>
               </a:ext>
             </a:extLst>
           </p:cNvPr>
@@ -6545,7 +6730,7 @@
           <p:cNvPr id="4" name="Picture 3">
             <a:extLst>
               <a:ext uri="{FF2B5EF4-FFF2-40B4-BE49-F238E27FC236}">
-                <a16:creationId xmlns="" xmlns:a16="http://schemas.microsoft.com/office/drawing/2014/main" id="{FCBD1747-E19F-4927-B7AB-4FDFACCD56EB}"/>
+                <a16:creationId xmlns:a16="http://schemas.microsoft.com/office/drawing/2014/main" xmlns="" id="{FCBD1747-E19F-4927-B7AB-4FDFACCD56EB}"/>
               </a:ext>
             </a:extLst>
           </p:cNvPr>
@@ -6580,6 +6765,13 @@
   <p:clrMapOvr>
     <a:masterClrMapping/>
   </p:clrMapOvr>
+  <p:timing>
+    <p:tnLst>
+      <p:par>
+        <p:cTn id="1" dur="indefinite" restart="never" nodeType="tmRoot"/>
+      </p:par>
+    </p:tnLst>
+  </p:timing>
 </p:sld>
 </file>
 
@@ -6605,7 +6797,7 @@
           <p:cNvPr id="2" name="Title 1">
             <a:extLst>
               <a:ext uri="{FF2B5EF4-FFF2-40B4-BE49-F238E27FC236}">
-                <a16:creationId xmlns="" xmlns:a16="http://schemas.microsoft.com/office/drawing/2014/main" id="{8FB09394-E721-41BB-8FB9-E4370A8824B4}"/>
+                <a16:creationId xmlns:a16="http://schemas.microsoft.com/office/drawing/2014/main" xmlns="" id="{8FB09394-E721-41BB-8FB9-E4370A8824B4}"/>
               </a:ext>
             </a:extLst>
           </p:cNvPr>
@@ -6660,7 +6852,7 @@
           <p:cNvPr id="4" name="Picture 3">
             <a:extLst>
               <a:ext uri="{FF2B5EF4-FFF2-40B4-BE49-F238E27FC236}">
-                <a16:creationId xmlns="" xmlns:a16="http://schemas.microsoft.com/office/drawing/2014/main" id="{9EC60220-D305-4028-94FE-C269D8742F6B}"/>
+                <a16:creationId xmlns:a16="http://schemas.microsoft.com/office/drawing/2014/main" xmlns="" id="{9EC60220-D305-4028-94FE-C269D8742F6B}"/>
               </a:ext>
             </a:extLst>
           </p:cNvPr>
@@ -6695,6 +6887,13 @@
   <p:clrMapOvr>
     <a:masterClrMapping/>
   </p:clrMapOvr>
+  <p:timing>
+    <p:tnLst>
+      <p:par>
+        <p:cTn id="1" dur="indefinite" restart="never" nodeType="tmRoot"/>
+      </p:par>
+    </p:tnLst>
+  </p:timing>
 </p:sld>
 </file>
 
@@ -7294,6 +7493,21 @@
 </file>
 
 <file path=customXml/item1.xml><?xml version="1.0" encoding="utf-8"?>
+<p:properties xmlns:p="http://schemas.microsoft.com/office/2006/metadata/properties" xmlns:xsi="http://www.w3.org/2001/XMLSchema-instance" xmlns:pc="http://schemas.microsoft.com/office/infopath/2007/PartnerControls">
+  <documentManagement/>
+</p:properties>
+</file>
+
+<file path=customXml/item2.xml><?xml version="1.0" encoding="utf-8"?>
+<?mso-contentType ?>
+<FormTemplates xmlns="http://schemas.microsoft.com/sharepoint/v3/contenttype/forms">
+  <Display>DocumentLibraryForm</Display>
+  <Edit>DocumentLibraryForm</Edit>
+  <New>DocumentLibraryForm</New>
+</FormTemplates>
+</file>
+
+<file path=customXml/item3.xml><?xml version="1.0" encoding="utf-8"?>
 <ct:contentTypeSchema xmlns:ct="http://schemas.microsoft.com/office/2006/metadata/contentType" xmlns:ma="http://schemas.microsoft.com/office/2006/metadata/properties/metaAttributes" ct:_="" ma:_="" ma:contentTypeName="Document" ma:contentTypeID="0x010100EAB60831B8CFFD4FBDCD7F039C0B2385" ma:contentTypeVersion="4" ma:contentTypeDescription="Create a new document." ma:contentTypeScope="" ma:versionID="b03e49a7dfb74dfa8ffd1dab83569975">
   <xsd:schema xmlns:xsd="http://www.w3.org/2001/XMLSchema" xmlns:xs="http://www.w3.org/2001/XMLSchema" xmlns:p="http://schemas.microsoft.com/office/2006/metadata/properties" xmlns:ns2="bb9dae85-31d5-47b3-9e5e-26885e3c5cb5" xmlns:ns3="d7c96ea8-3c5f-485d-9406-dc7e46904840" targetNamespace="http://schemas.microsoft.com/office/2006/metadata/properties" ma:root="true" ma:fieldsID="2b44a8b18083c4a37fc3288b07c52f8f" ns2:_="" ns3:_="">
     <xsd:import namespace="bb9dae85-31d5-47b3-9e5e-26885e3c5cb5"/>
@@ -7458,22 +7672,32 @@
 </ct:contentTypeSchema>
 </file>
 
-<file path=customXml/item2.xml><?xml version="1.0" encoding="utf-8"?>
-<?mso-contentType ?>
-<FormTemplates xmlns="http://schemas.microsoft.com/sharepoint/v3/contenttype/forms">
-  <Display>DocumentLibraryForm</Display>
-  <Edit>DocumentLibraryForm</Edit>
-  <New>DocumentLibraryForm</New>
-</FormTemplates>
+<file path=customXml/itemProps1.xml><?xml version="1.0" encoding="utf-8"?>
+<ds:datastoreItem xmlns:ds="http://schemas.openxmlformats.org/officeDocument/2006/customXml" ds:itemID="{718D9687-1D05-421D-8278-CFBDF6E3600D}">
+  <ds:schemaRefs>
+    <ds:schemaRef ds:uri="d7c96ea8-3c5f-485d-9406-dc7e46904840"/>
+    <ds:schemaRef ds:uri="http://schemas.microsoft.com/office/2006/metadata/properties"/>
+    <ds:schemaRef ds:uri="http://schemas.microsoft.com/office/2006/documentManagement/types"/>
+    <ds:schemaRef ds:uri="http://www.w3.org/XML/1998/namespace"/>
+    <ds:schemaRef ds:uri="http://purl.org/dc/dcmitype/"/>
+    <ds:schemaRef ds:uri="http://purl.org/dc/terms/"/>
+    <ds:schemaRef ds:uri="bb9dae85-31d5-47b3-9e5e-26885e3c5cb5"/>
+    <ds:schemaRef ds:uri="http://purl.org/dc/elements/1.1/"/>
+    <ds:schemaRef ds:uri="http://schemas.microsoft.com/office/infopath/2007/PartnerControls"/>
+    <ds:schemaRef ds:uri="http://schemas.openxmlformats.org/package/2006/metadata/core-properties"/>
+  </ds:schemaRefs>
+</ds:datastoreItem>
 </file>
 
-<file path=customXml/item3.xml><?xml version="1.0" encoding="utf-8"?>
-<p:properties xmlns:p="http://schemas.microsoft.com/office/2006/metadata/properties" xmlns:xsi="http://www.w3.org/2001/XMLSchema-instance" xmlns:pc="http://schemas.microsoft.com/office/infopath/2007/PartnerControls">
-  <documentManagement/>
-</p:properties>
+<file path=customXml/itemProps2.xml><?xml version="1.0" encoding="utf-8"?>
+<ds:datastoreItem xmlns:ds="http://schemas.openxmlformats.org/officeDocument/2006/customXml" ds:itemID="{9BC70E15-2DAD-4A64-9D48-E81BDFD043C9}">
+  <ds:schemaRefs>
+    <ds:schemaRef ds:uri="http://schemas.microsoft.com/sharepoint/v3/contenttype/forms"/>
+  </ds:schemaRefs>
+</ds:datastoreItem>
 </file>
 
-<file path=customXml/itemProps1.xml><?xml version="1.0" encoding="utf-8"?>
+<file path=customXml/itemProps3.xml><?xml version="1.0" encoding="utf-8"?>
 <ds:datastoreItem xmlns:ds="http://schemas.openxmlformats.org/officeDocument/2006/customXml" ds:itemID="{AF997D6D-5CD0-4D92-9F73-CE1E7D6B486E}">
   <ds:schemaRefs>
     <ds:schemaRef ds:uri="http://schemas.microsoft.com/office/2006/metadata/contentType"/>
@@ -7490,29 +7714,4 @@
     <ds:schemaRef ds:uri="http://schemas.microsoft.com/internal/obd"/>
   </ds:schemaRefs>
 </ds:datastoreItem>
-</file>
-
-<file path=customXml/itemProps2.xml><?xml version="1.0" encoding="utf-8"?>
-<ds:datastoreItem xmlns:ds="http://schemas.openxmlformats.org/officeDocument/2006/customXml" ds:itemID="{9BC70E15-2DAD-4A64-9D48-E81BDFD043C9}">
-  <ds:schemaRefs>
-    <ds:schemaRef ds:uri="http://schemas.microsoft.com/sharepoint/v3/contenttype/forms"/>
-  </ds:schemaRefs>
-</ds:datastoreItem>
-</file>
-
-<file path=customXml/itemProps3.xml><?xml version="1.0" encoding="utf-8"?>
-<ds:datastoreItem xmlns:ds="http://schemas.openxmlformats.org/officeDocument/2006/customXml" ds:itemID="{718D9687-1D05-421D-8278-CFBDF6E3600D}">
-  <ds:schemaRefs>
-    <ds:schemaRef ds:uri="d7c96ea8-3c5f-485d-9406-dc7e46904840"/>
-    <ds:schemaRef ds:uri="http://schemas.microsoft.com/office/2006/metadata/properties"/>
-    <ds:schemaRef ds:uri="http://schemas.microsoft.com/office/2006/documentManagement/types"/>
-    <ds:schemaRef ds:uri="http://www.w3.org/XML/1998/namespace"/>
-    <ds:schemaRef ds:uri="http://purl.org/dc/dcmitype/"/>
-    <ds:schemaRef ds:uri="http://purl.org/dc/terms/"/>
-    <ds:schemaRef ds:uri="bb9dae85-31d5-47b3-9e5e-26885e3c5cb5"/>
-    <ds:schemaRef ds:uri="http://purl.org/dc/elements/1.1/"/>
-    <ds:schemaRef ds:uri="http://schemas.microsoft.com/office/infopath/2007/PartnerControls"/>
-    <ds:schemaRef ds:uri="http://schemas.openxmlformats.org/package/2006/metadata/core-properties"/>
-  </ds:schemaRefs>
-</ds:datastoreItem>
 </file>
</xml_diff>